<commit_message>
Added +1 participant to team
</commit_message>
<xml_diff>
--- a/Presentation.pptx
+++ b/Presentation.pptx
@@ -3417,36 +3417,7 @@
                   </a:outerShdw>
                 </a:effectLst>
               </a:rPr>
-              <a:t>Группа </a:t>
-            </a:r>
-            <a:r>
-              <a:rPr lang="ru-RU" b="1" spc="50" dirty="0" smtClean="0">
-                <a:ln w="11430"/>
-                <a:gradFill>
-                  <a:gsLst>
-                    <a:gs pos="25000">
-                      <a:schemeClr val="accent2">
-                        <a:satMod val="155000"/>
-                      </a:schemeClr>
-                    </a:gs>
-                    <a:gs pos="100000">
-                      <a:schemeClr val="accent2">
-                        <a:shade val="45000"/>
-                        <a:satMod val="165000"/>
-                      </a:schemeClr>
-                    </a:gs>
-                  </a:gsLst>
-                  <a:lin ang="5400000"/>
-                </a:gradFill>
-                <a:effectLst>
-                  <a:outerShdw blurRad="76200" dist="50800" dir="5400000" algn="tl" rotWithShape="0">
-                    <a:srgbClr val="000000">
-                      <a:alpha val="65000"/>
-                    </a:srgbClr>
-                  </a:outerShdw>
-                </a:effectLst>
-              </a:rPr>
-              <a:t>6</a:t>
+              <a:t>Группа 6</a:t>
             </a:r>
             <a:endParaRPr lang="uk-UA" b="1" spc="50" dirty="0">
               <a:ln w="11430"/>
@@ -4651,6 +4622,64 @@
           <a:p>
             <a:pPr algn="ctr"/>
             <a:endParaRPr lang="ru-RU" b="1" spc="50" dirty="0" smtClean="0">
+              <a:ln w="11430"/>
+              <a:gradFill>
+                <a:gsLst>
+                  <a:gs pos="25000">
+                    <a:schemeClr val="accent2">
+                      <a:satMod val="155000"/>
+                    </a:schemeClr>
+                  </a:gs>
+                  <a:gs pos="100000">
+                    <a:schemeClr val="accent2">
+                      <a:shade val="45000"/>
+                      <a:satMod val="165000"/>
+                    </a:schemeClr>
+                  </a:gs>
+                </a:gsLst>
+                <a:lin ang="5400000"/>
+              </a:gradFill>
+              <a:effectLst>
+                <a:outerShdw blurRad="76200" dist="50800" dir="5400000" algn="tl" rotWithShape="0">
+                  <a:srgbClr val="000000">
+                    <a:alpha val="65000"/>
+                  </a:srgbClr>
+                </a:outerShdw>
+              </a:effectLst>
+            </a:endParaRPr>
+          </a:p>
+          <a:p>
+            <a:pPr algn="ctr"/>
+            <a:r>
+              <a:rPr lang="ru-RU" b="1" spc="50" smtClean="0">
+                <a:ln w="11430"/>
+                <a:gradFill>
+                  <a:gsLst>
+                    <a:gs pos="25000">
+                      <a:schemeClr val="accent2">
+                        <a:satMod val="155000"/>
+                      </a:schemeClr>
+                    </a:gs>
+                    <a:gs pos="100000">
+                      <a:schemeClr val="accent2">
+                        <a:shade val="45000"/>
+                        <a:satMod val="165000"/>
+                      </a:schemeClr>
+                    </a:gs>
+                  </a:gsLst>
+                  <a:lin ang="5400000"/>
+                </a:gradFill>
+                <a:effectLst>
+                  <a:outerShdw blurRad="76200" dist="50800" dir="5400000" algn="tl" rotWithShape="0">
+                    <a:srgbClr val="000000">
+                      <a:alpha val="65000"/>
+                    </a:srgbClr>
+                  </a:outerShdw>
+                </a:effectLst>
+              </a:rPr>
+              <a:t>Алексей Ефименко</a:t>
+            </a:r>
+            <a:endParaRPr lang="en-US" b="1" spc="50" smtClean="0">
               <a:ln w="11430"/>
               <a:gradFill>
                 <a:gsLst>
@@ -6141,8 +6170,8 @@
           </a:p>
         </p:txBody>
       </p:sp>
-      <mc:AlternateContent xmlns:mc="http://schemas.openxmlformats.org/markup-compatibility/2006">
-        <mc:Choice xmlns:a14="http://schemas.microsoft.com/office/drawing/2010/main" Requires="a14">
+      <mc:AlternateContent xmlns:mc="http://schemas.openxmlformats.org/markup-compatibility/2006" xmlns:a14="http://schemas.microsoft.com/office/drawing/2010/main">
+        <mc:Choice Requires="a14">
           <p:sp>
             <p:nvSpPr>
               <p:cNvPr id="3" name="Подзаголовок 2"/>
@@ -6185,28 +6214,7 @@
                       </a:outerShdw>
                     </a:effectLst>
                   </a:rPr>
-                  <a:t>    Преобразование произвольного числа в десятичное основано на формуле</a:t>
-                </a:r>
-                <a:r>
-                  <a:rPr lang="ru-RU" sz="2000" dirty="0" smtClean="0">
-                    <a:ln w="10160">
-                      <a:solidFill>
-                        <a:schemeClr val="accent1"/>
-                      </a:solidFill>
-                      <a:prstDash val="solid"/>
-                    </a:ln>
-                    <a:solidFill>
-                      <a:srgbClr val="FFFFFF"/>
-                    </a:solidFill>
-                    <a:effectLst>
-                      <a:outerShdw blurRad="38100" dist="32000" dir="5400000" algn="tl">
-                        <a:srgbClr val="000000">
-                          <a:alpha val="30000"/>
-                        </a:srgbClr>
-                      </a:outerShdw>
-                    </a:effectLst>
-                  </a:rPr>
-                  <a:t>:</a:t>
+                  <a:t>    Преобразование произвольного числа в десятичное основано на формуле:</a:t>
                 </a:r>
               </a:p>
               <a:p>
@@ -7532,28 +7540,7 @@
                       </a:outerShdw>
                     </a:effectLst>
                   </a:rPr>
-                  <a:t> полученный остаток от деления является </a:t>
-                </a:r>
-                <a:r>
-                  <a:rPr lang="ru-RU" sz="2000" dirty="0" smtClean="0">
-                    <a:ln w="10160">
-                      <a:solidFill>
-                        <a:schemeClr val="accent1"/>
-                      </a:solidFill>
-                      <a:prstDash val="solid"/>
-                    </a:ln>
-                    <a:solidFill>
-                      <a:srgbClr val="FFFFFF"/>
-                    </a:solidFill>
-                    <a:effectLst>
-                      <a:outerShdw blurRad="38100" dist="38100" dir="2700000" algn="tl">
-                        <a:srgbClr val="000000">
-                          <a:alpha val="43137"/>
-                        </a:srgbClr>
-                      </a:outerShdw>
-                    </a:effectLst>
-                  </a:rPr>
-                  <a:t>старшим разрядом двоичного числа.</a:t>
+                  <a:t> полученный остаток от деления является старшим разрядом двоичного числа.</a:t>
                 </a:r>
               </a:p>
               <a:p>
@@ -7685,7 +7672,7 @@
             </p:txBody>
           </p:sp>
         </mc:Choice>
-        <mc:Fallback>
+        <mc:Fallback xmlns="">
           <p:sp>
             <p:nvSpPr>
               <p:cNvPr id="3" name="Подзаголовок 2"/>

</xml_diff>